<commit_message>
επεξήγηση του federated identity pattern
</commit_message>
<xml_diff>
--- a/Exercise 3/Microsoft Design Patterns/Microsoft Design Patterns.pptx
+++ b/Exercise 3/Microsoft Design Patterns/Microsoft Design Patterns.pptx
@@ -8,6 +8,9 @@
     <p:sldId id="256" r:id="rId2"/>
     <p:sldId id="257" r:id="rId3"/>
     <p:sldId id="258" r:id="rId4"/>
+    <p:sldId id="259" r:id="rId5"/>
+    <p:sldId id="260" r:id="rId6"/>
+    <p:sldId id="261" r:id="rId7"/>
   </p:sldIdLst>
   <p:sldSz cx="12192000" cy="6858000"/>
   <p:notesSz cx="6858000" cy="9144000"/>
@@ -3618,26 +3621,326 @@
               <a:t>Το πρότυπο αυτό, σιγουρεύεται ότι οι χρήστες ενός οργανισμού ή μιας εταιρείας, θα μπορούν να εξασφαλίσουν την «ομοσπονδιακή ταυτότητά» τους. </a:t>
             </a:r>
           </a:p>
-          <a:p>
-            <a:pPr marL="0" indent="0">
-              <a:buNone/>
-            </a:pPr>
-            <a:r>
-              <a:rPr lang="el-GR" dirty="0"/>
-              <a:t>Ας υποθέσουμε, δηλαδή, ότι υπάρχει μια εταιρεία που χρησιμοποιεί διάφορες εφαρμογές. Χωρίς αυτό το πρότυπο, οι υπάλληλοι αυτής της εταιρείας, θα πρέπει να απομνημονεύουν όλους τους τους κωδικούς για κάθε εφαρμογή. </a:t>
-            </a:r>
-            <a:r>
-              <a:rPr lang="el-GR" b="1" dirty="0"/>
-              <a:t>Με το πρότυπο αυτό, οι υπάλληλοι θα πρέπει να θυμούνται το κωδικό τους μόνο σε ένα κεντρικό σύστημα, που θα τους δίνει πρόσβαση σε όλες τις εφαρμογές.</a:t>
-            </a:r>
-            <a:endParaRPr lang="en-US" b="1" dirty="0"/>
-          </a:p>
         </p:txBody>
       </p:sp>
     </p:spTree>
     <p:extLst>
       <p:ext uri="{BB962C8B-B14F-4D97-AF65-F5344CB8AC3E}">
         <p14:creationId xmlns:p14="http://schemas.microsoft.com/office/powerpoint/2010/main" val="450235005"/>
+      </p:ext>
+    </p:extLst>
+  </p:cSld>
+  <p:clrMapOvr>
+    <a:masterClrMapping/>
+  </p:clrMapOvr>
+</p:sld>
+</file>
+
+<file path=ppt/slides/slide4.xml><?xml version="1.0" encoding="utf-8"?>
+<p:sld xmlns:a="http://schemas.openxmlformats.org/drawingml/2006/main" xmlns:r="http://schemas.openxmlformats.org/officeDocument/2006/relationships" xmlns:p="http://schemas.openxmlformats.org/presentationml/2006/main">
+  <p:cSld>
+    <p:spTree>
+      <p:nvGrpSpPr>
+        <p:cNvPr id="1" name=""/>
+        <p:cNvGrpSpPr/>
+        <p:nvPr/>
+      </p:nvGrpSpPr>
+      <p:grpSpPr>
+        <a:xfrm>
+          <a:off x="0" y="0"/>
+          <a:ext cx="0" cy="0"/>
+          <a:chOff x="0" y="0"/>
+          <a:chExt cx="0" cy="0"/>
+        </a:xfrm>
+      </p:grpSpPr>
+      <p:sp>
+        <p:nvSpPr>
+          <p:cNvPr id="2" name="Title 1">
+            <a:extLst>
+              <a:ext uri="{FF2B5EF4-FFF2-40B4-BE49-F238E27FC236}">
+                <a16:creationId xmlns:a16="http://schemas.microsoft.com/office/drawing/2014/main" id="{5BBCE517-C62B-24B1-BC9C-16B2AA16BAFC}"/>
+              </a:ext>
+            </a:extLst>
+          </p:cNvPr>
+          <p:cNvSpPr>
+            <a:spLocks noGrp="1"/>
+          </p:cNvSpPr>
+          <p:nvPr>
+            <p:ph type="title"/>
+          </p:nvPr>
+        </p:nvSpPr>
+        <p:spPr/>
+        <p:txBody>
+          <a:bodyPr/>
+          <a:lstStyle/>
+          <a:p>
+            <a:r>
+              <a:rPr lang="el-GR" dirty="0"/>
+              <a:t>ΠΡΟΒΛΗΜΑΤΑ ΜΗ ΧΡΗΣΗΣ ΤΟΥ </a:t>
+            </a:r>
+            <a:r>
+              <a:rPr lang="en-US" dirty="0"/>
+              <a:t>FEDERATED IDENTITY PATTERN</a:t>
+            </a:r>
+          </a:p>
+        </p:txBody>
+      </p:sp>
+      <p:sp>
+        <p:nvSpPr>
+          <p:cNvPr id="4" name="Content Placeholder 3">
+            <a:extLst>
+              <a:ext uri="{FF2B5EF4-FFF2-40B4-BE49-F238E27FC236}">
+                <a16:creationId xmlns:a16="http://schemas.microsoft.com/office/drawing/2014/main" id="{72277CAF-0A8E-D9F2-E01F-8CA02D4F0A9E}"/>
+              </a:ext>
+            </a:extLst>
+          </p:cNvPr>
+          <p:cNvSpPr>
+            <a:spLocks noGrp="1"/>
+          </p:cNvSpPr>
+          <p:nvPr>
+            <p:ph idx="1"/>
+          </p:nvPr>
+        </p:nvSpPr>
+        <p:spPr/>
+        <p:txBody>
+          <a:bodyPr/>
+          <a:lstStyle/>
+          <a:p>
+            <a:pPr marL="0" indent="0">
+              <a:buNone/>
+            </a:pPr>
+            <a:r>
+              <a:rPr lang="el-GR" b="1" dirty="0"/>
+              <a:t>Πριν χρησιμοποιήσουμε αυτό το πρότυπο, θα παρατηρηθεί ότι μια εταιρεία (που χρησιμοποιεί πολλές διαφορετικές εφαρμογές) έχει τα εξής προβλήματα:</a:t>
+            </a:r>
+          </a:p>
+          <a:p>
+            <a:r>
+              <a:rPr lang="el-GR" dirty="0"/>
+              <a:t>Οι χρήστες της εφαρμογής θα πρέπει να απομνημονεύουν πολλούς κωδικούς.</a:t>
+            </a:r>
+          </a:p>
+          <a:p>
+            <a:r>
+              <a:rPr lang="el-GR" dirty="0"/>
+              <a:t>Όταν φεύγει ένας υπάλληλος, θα πρέπει να σβηστούν όλοι οι λογαριασμοί του.</a:t>
+            </a:r>
+          </a:p>
+          <a:p>
+            <a:r>
+              <a:rPr lang="el-GR" dirty="0"/>
+              <a:t>Ο δουλειά του διαχειριστή των λογαριασμών θα είναι πολύπλοκη.</a:t>
+            </a:r>
+          </a:p>
+          <a:p>
+            <a:endParaRPr lang="el-GR" dirty="0"/>
+          </a:p>
+          <a:p>
+            <a:endParaRPr lang="el-GR" dirty="0"/>
+          </a:p>
+          <a:p>
+            <a:endParaRPr lang="el-GR" dirty="0"/>
+          </a:p>
+          <a:p>
+            <a:endParaRPr lang="en-US" dirty="0"/>
+          </a:p>
+        </p:txBody>
+      </p:sp>
+    </p:spTree>
+    <p:extLst>
+      <p:ext uri="{BB962C8B-B14F-4D97-AF65-F5344CB8AC3E}">
+        <p14:creationId xmlns:p14="http://schemas.microsoft.com/office/powerpoint/2010/main" val="2188653655"/>
+      </p:ext>
+    </p:extLst>
+  </p:cSld>
+  <p:clrMapOvr>
+    <a:masterClrMapping/>
+  </p:clrMapOvr>
+</p:sld>
+</file>
+
+<file path=ppt/slides/slide5.xml><?xml version="1.0" encoding="utf-8"?>
+<p:sld xmlns:a="http://schemas.openxmlformats.org/drawingml/2006/main" xmlns:r="http://schemas.openxmlformats.org/officeDocument/2006/relationships" xmlns:p="http://schemas.openxmlformats.org/presentationml/2006/main">
+  <p:cSld>
+    <p:spTree>
+      <p:nvGrpSpPr>
+        <p:cNvPr id="1" name=""/>
+        <p:cNvGrpSpPr/>
+        <p:nvPr/>
+      </p:nvGrpSpPr>
+      <p:grpSpPr>
+        <a:xfrm>
+          <a:off x="0" y="0"/>
+          <a:ext cx="0" cy="0"/>
+          <a:chOff x="0" y="0"/>
+          <a:chExt cx="0" cy="0"/>
+        </a:xfrm>
+      </p:grpSpPr>
+      <p:sp>
+        <p:nvSpPr>
+          <p:cNvPr id="2" name="Title 1">
+            <a:extLst>
+              <a:ext uri="{FF2B5EF4-FFF2-40B4-BE49-F238E27FC236}">
+                <a16:creationId xmlns:a16="http://schemas.microsoft.com/office/drawing/2014/main" id="{35C58E56-8EDC-B088-EB79-7A665059E919}"/>
+              </a:ext>
+            </a:extLst>
+          </p:cNvPr>
+          <p:cNvSpPr>
+            <a:spLocks noGrp="1"/>
+          </p:cNvSpPr>
+          <p:nvPr>
+            <p:ph type="title"/>
+          </p:nvPr>
+        </p:nvSpPr>
+        <p:spPr/>
+        <p:txBody>
+          <a:bodyPr/>
+          <a:lstStyle/>
+          <a:p>
+            <a:r>
+              <a:rPr lang="el-GR" dirty="0"/>
+              <a:t>ΠΩΣ ΧΡΗΣΙΜΟΠΟΙΕΙΤΑΙ ΤΟ </a:t>
+            </a:r>
+            <a:r>
+              <a:rPr lang="en-US" dirty="0"/>
+              <a:t>FEDERATED IDENTITY PATTERN;</a:t>
+            </a:r>
+          </a:p>
+        </p:txBody>
+      </p:sp>
+      <p:sp>
+        <p:nvSpPr>
+          <p:cNvPr id="3" name="Content Placeholder 2">
+            <a:extLst>
+              <a:ext uri="{FF2B5EF4-FFF2-40B4-BE49-F238E27FC236}">
+                <a16:creationId xmlns:a16="http://schemas.microsoft.com/office/drawing/2014/main" id="{60564AFB-7D38-C605-FF9D-F1B303931481}"/>
+              </a:ext>
+            </a:extLst>
+          </p:cNvPr>
+          <p:cNvSpPr>
+            <a:spLocks noGrp="1"/>
+          </p:cNvSpPr>
+          <p:nvPr>
+            <p:ph idx="1"/>
+          </p:nvPr>
+        </p:nvSpPr>
+        <p:spPr/>
+        <p:txBody>
+          <a:bodyPr/>
+          <a:lstStyle/>
+          <a:p>
+            <a:r>
+              <a:rPr lang="el-GR" dirty="0"/>
+              <a:t>Φτιάχνοντας ένα κεντρικό σύστημα σύνδεσης και αποσύνδεσης χρηστών.</a:t>
+            </a:r>
+          </a:p>
+          <a:p>
+            <a:pPr marL="0" indent="0">
+              <a:buNone/>
+            </a:pPr>
+            <a:r>
+              <a:rPr lang="el-GR" dirty="0"/>
+              <a:t>Το σύστημα αυτό θα συνδέεται με όλες τις εφαρμογές, που χρησιμοποεί η εταιρεία. Επίσης, θα κρυπτογραφεί τους κωδικούς που χρησιμοποιούνται από κάθε χρήστη και θα τους εξασφαλίζει την «ομοσπονδιακή ταυτότητα».</a:t>
+            </a:r>
+          </a:p>
+        </p:txBody>
+      </p:sp>
+    </p:spTree>
+    <p:extLst>
+      <p:ext uri="{BB962C8B-B14F-4D97-AF65-F5344CB8AC3E}">
+        <p14:creationId xmlns:p14="http://schemas.microsoft.com/office/powerpoint/2010/main" val="2396199710"/>
+      </p:ext>
+    </p:extLst>
+  </p:cSld>
+  <p:clrMapOvr>
+    <a:masterClrMapping/>
+  </p:clrMapOvr>
+</p:sld>
+</file>
+
+<file path=ppt/slides/slide6.xml><?xml version="1.0" encoding="utf-8"?>
+<p:sld xmlns:a="http://schemas.openxmlformats.org/drawingml/2006/main" xmlns:r="http://schemas.openxmlformats.org/officeDocument/2006/relationships" xmlns:p="http://schemas.openxmlformats.org/presentationml/2006/main">
+  <p:cSld>
+    <p:spTree>
+      <p:nvGrpSpPr>
+        <p:cNvPr id="1" name=""/>
+        <p:cNvGrpSpPr/>
+        <p:nvPr/>
+      </p:nvGrpSpPr>
+      <p:grpSpPr>
+        <a:xfrm>
+          <a:off x="0" y="0"/>
+          <a:ext cx="0" cy="0"/>
+          <a:chOff x="0" y="0"/>
+          <a:chExt cx="0" cy="0"/>
+        </a:xfrm>
+      </p:grpSpPr>
+      <p:sp>
+        <p:nvSpPr>
+          <p:cNvPr id="2" name="Title 1">
+            <a:extLst>
+              <a:ext uri="{FF2B5EF4-FFF2-40B4-BE49-F238E27FC236}">
+                <a16:creationId xmlns:a16="http://schemas.microsoft.com/office/drawing/2014/main" id="{8E810CA0-37CA-60AF-112F-AD5C4ABC75BD}"/>
+              </a:ext>
+            </a:extLst>
+          </p:cNvPr>
+          <p:cNvSpPr>
+            <a:spLocks noGrp="1"/>
+          </p:cNvSpPr>
+          <p:nvPr>
+            <p:ph type="title"/>
+          </p:nvPr>
+        </p:nvSpPr>
+        <p:spPr/>
+        <p:txBody>
+          <a:bodyPr/>
+          <a:lstStyle/>
+          <a:p>
+            <a:r>
+              <a:rPr lang="el-GR" dirty="0"/>
+              <a:t>ΤΟ </a:t>
+            </a:r>
+            <a:r>
+              <a:rPr lang="en-US" dirty="0"/>
+              <a:t>FEDERATED IDENTITY PATTERN </a:t>
+            </a:r>
+            <a:r>
+              <a:rPr lang="el-GR"/>
+              <a:t>ΣΕ ΚΩΔΙΚΑ</a:t>
+            </a:r>
+            <a:endParaRPr lang="en-US"/>
+          </a:p>
+        </p:txBody>
+      </p:sp>
+      <p:sp>
+        <p:nvSpPr>
+          <p:cNvPr id="3" name="Content Placeholder 2">
+            <a:extLst>
+              <a:ext uri="{FF2B5EF4-FFF2-40B4-BE49-F238E27FC236}">
+                <a16:creationId xmlns:a16="http://schemas.microsoft.com/office/drawing/2014/main" id="{E5A9AF98-455B-FE96-7C86-AA21F10D43C0}"/>
+              </a:ext>
+            </a:extLst>
+          </p:cNvPr>
+          <p:cNvSpPr>
+            <a:spLocks noGrp="1"/>
+          </p:cNvSpPr>
+          <p:nvPr>
+            <p:ph idx="1"/>
+          </p:nvPr>
+        </p:nvSpPr>
+        <p:spPr/>
+        <p:txBody>
+          <a:bodyPr/>
+          <a:lstStyle/>
+          <a:p>
+            <a:endParaRPr lang="en-US"/>
+          </a:p>
+        </p:txBody>
+      </p:sp>
+    </p:spTree>
+    <p:extLst>
+      <p:ext uri="{BB962C8B-B14F-4D97-AF65-F5344CB8AC3E}">
+        <p14:creationId xmlns:p14="http://schemas.microsoft.com/office/powerpoint/2010/main" val="2093213371"/>
       </p:ext>
     </p:extLst>
   </p:cSld>

</xml_diff>